<commit_message>
Added OWIN Fundamentals Slides
</commit_message>
<xml_diff>
--- a/OwinFundamentals/Slides/OWIN Fundamentals.pptx
+++ b/OwinFundamentals/Slides/OWIN Fundamentals.pptx
@@ -251,7 +251,7 @@
           <a:p>
             <a:fld id="{D3FDC4BA-F62C-46A2-87C1-2103180CFF88}" type="datetimeFigureOut">
               <a:rPr lang="de-AT" smtClean="0"/>
-              <a:t>04.05.2015</a:t>
+              <a:t>08.05.2015</a:t>
             </a:fld>
             <a:endParaRPr lang="de-AT"/>
           </a:p>
@@ -417,7 +417,7 @@
             <a:fld id="{3612A09C-9A01-4873-9E29-1DA9CA5B5B01}" type="datetimeFigureOut">
               <a:rPr lang="de-DE" smtClean="0"/>
               <a:pPr/>
-              <a:t>04.05.2015</a:t>
+              <a:t>08.05.2015</a:t>
             </a:fld>
             <a:endParaRPr lang="de-AT"/>
           </a:p>
@@ -12458,11 +12458,7 @@
             </a:r>
             <a:r>
               <a:rPr lang="en-US" noProof="1"/>
-              <a:t>(async context </a:t>
-            </a:r>
-            <a:r>
-              <a:rPr lang="en-US" noProof="1"/>
-              <a:t>=&gt; </a:t>
+              <a:t>(async context =&gt; </a:t>
             </a:r>
             <a:endParaRPr lang="en-US" noProof="1" smtClean="0"/>
           </a:p>
@@ -12829,15 +12825,7 @@
                   <a:srgbClr val="00B050"/>
                 </a:solidFill>
               </a:rPr>
-              <a:t>public HelloWorldMiddleware(AppFunc next</a:t>
-            </a:r>
-            <a:r>
-              <a:rPr lang="en-US" noProof="1">
-                <a:solidFill>
-                  <a:srgbClr val="00B050"/>
-                </a:solidFill>
-              </a:rPr>
-              <a:t>, </a:t>
+              <a:t>public HelloWorldMiddleware(AppFunc next, </a:t>
             </a:r>
             <a:endParaRPr lang="en-US" noProof="1" smtClean="0">
               <a:solidFill>
@@ -13168,11 +13156,7 @@
           <a:p>
             <a:r>
               <a:rPr lang="en-US" noProof="1"/>
-              <a:t>	public static void </a:t>
-            </a:r>
-            <a:r>
-              <a:rPr lang="en-US" noProof="1"/>
-              <a:t>UseHelloWorld</a:t>
+              <a:t>	public static void UseHelloWorld</a:t>
             </a:r>
             <a:r>
               <a:rPr lang="en-US" noProof="1" smtClean="0"/>
@@ -13274,11 +13258,7 @@
           <a:p>
             <a:r>
               <a:rPr lang="en-US" noProof="1"/>
-              <a:t>	</a:t>
-            </a:r>
-            <a:r>
-              <a:rPr lang="en-US" noProof="1"/>
-              <a:t>	</a:t>
+              <a:t>		</a:t>
             </a:r>
             <a:r>
               <a:rPr lang="en-US" noProof="1" smtClean="0"/>
@@ -13300,11 +13280,7 @@
           <a:p>
             <a:r>
               <a:rPr lang="en-US" noProof="1"/>
-              <a:t>			new HelloWorldOptions() </a:t>
-            </a:r>
-            <a:r>
-              <a:rPr lang="en-US" noProof="1"/>
-              <a:t>{ </a:t>
+              <a:t>			new HelloWorldOptions() { </a:t>
             </a:r>
             <a:endParaRPr lang="en-US" noProof="1" smtClean="0"/>
           </a:p>
@@ -13319,11 +13295,7 @@
             </a:r>
             <a:r>
               <a:rPr lang="en-US" noProof="1"/>
-              <a:t>= "Hello from Middleware Class</a:t>
-            </a:r>
-            <a:r>
-              <a:rPr lang="en-US" noProof="1"/>
-              <a:t>" </a:t>
+              <a:t>= "Hello from Middleware Class" </a:t>
             </a:r>
             <a:endParaRPr lang="en-US" noProof="1" smtClean="0"/>
           </a:p>
@@ -13933,11 +13905,7 @@
           <a:p>
             <a:r>
               <a:rPr lang="en-US" noProof="1"/>
-              <a:t>	</a:t>
-            </a:r>
-            <a:r>
-              <a:rPr lang="en-US" noProof="1"/>
-              <a:t>	</a:t>
+              <a:t>		</a:t>
             </a:r>
             <a:r>
               <a:rPr lang="en-US" noProof="1" smtClean="0"/>
@@ -14022,11 +13990,7 @@
           <a:p>
             <a:r>
               <a:rPr lang="en-US" noProof="1"/>
-              <a:t>		return </a:t>
-            </a:r>
-            <a:r>
-              <a:rPr lang="en-US" noProof="1"/>
-              <a:t>this.Ok</a:t>
+              <a:t>		return this.Ok</a:t>
             </a:r>
             <a:r>
               <a:rPr lang="en-US" noProof="1" smtClean="0"/>
@@ -14044,11 +14008,7 @@
             </a:r>
             <a:r>
               <a:rPr lang="en-US" noProof="1"/>
-              <a:t>{ </a:t>
-            </a:r>
-            <a:r>
-              <a:rPr lang="en-US" noProof="1"/>
-              <a:t>customerId </a:t>
+              <a:t>{ customerId </a:t>
             </a:r>
             <a:r>
               <a:rPr lang="en-US" noProof="1" smtClean="0"/>
@@ -14056,11 +14016,7 @@
             </a:r>
             <a:r>
               <a:rPr lang="en-US" noProof="1"/>
-              <a:t>, </a:t>
-            </a:r>
-            <a:r>
-              <a:rPr lang="en-US" noProof="1"/>
-              <a:t>customerName </a:t>
+              <a:t>, customerName </a:t>
             </a:r>
             <a:r>
               <a:rPr lang="en-US" noProof="1" smtClean="0"/>
@@ -14489,7 +14445,15 @@
           <a:p>
             <a:r>
               <a:rPr lang="en-US" dirty="0" smtClean="0"/>
-              <a:t>It is not platform independent </a:t>
+              <a:t>It is </a:t>
+            </a:r>
+            <a:r>
+              <a:rPr lang="en-US" dirty="0" smtClean="0"/>
+              <a:t>now </a:t>
+            </a:r>
+            <a:r>
+              <a:rPr lang="en-US" dirty="0" smtClean="0"/>
+              <a:t>platform independent </a:t>
             </a:r>
             <a:r>
               <a:rPr lang="en-US" dirty="0" smtClean="0">
@@ -14800,11 +14764,7 @@
           <a:p>
             <a:r>
               <a:rPr lang="en-US" noProof="1"/>
-              <a:t>			</a:t>
-            </a:r>
-            <a:r>
-              <a:rPr lang="en-US" noProof="1"/>
-              <a:t>app.</a:t>
+              <a:t>			app.</a:t>
             </a:r>
             <a:r>
               <a:rPr lang="en-US" noProof="1">
@@ -14893,11 +14853,7 @@
           <a:p>
             <a:r>
               <a:rPr lang="en-US" noProof="1"/>
-              <a:t>			return new </a:t>
-            </a:r>
-            <a:r>
-              <a:rPr lang="en-US" noProof="1"/>
-              <a:t>ObjectResult</a:t>
+              <a:t>			return new ObjectResult</a:t>
             </a:r>
             <a:r>
               <a:rPr lang="en-US" noProof="1" smtClean="0"/>
@@ -14915,11 +14871,7 @@
             </a:r>
             <a:r>
               <a:rPr lang="en-US" noProof="1"/>
-              <a:t>{ customerId = id</a:t>
-            </a:r>
-            <a:r>
-              <a:rPr lang="en-US" noProof="1"/>
-              <a:t>, </a:t>
+              <a:t>{ customerId = id, </a:t>
             </a:r>
             <a:endParaRPr lang="en-US" noProof="1" smtClean="0"/>
           </a:p>
@@ -15143,11 +15095,7 @@
           <a:p>
             <a:r>
               <a:rPr lang="en-US" sz="1100" noProof="1"/>
-              <a:t>					FileProvider = new </a:t>
-            </a:r>
-            <a:r>
-              <a:rPr lang="en-US" sz="1100" noProof="1"/>
-              <a:t>PhysicalFileProvider</a:t>
+              <a:t>					FileProvider = new PhysicalFileProvider</a:t>
             </a:r>
             <a:r>
               <a:rPr lang="en-US" sz="1100" noProof="1" smtClean="0"/>
@@ -15198,11 +15146,7 @@
           <a:p>
             <a:r>
               <a:rPr lang="en-US" sz="1100" noProof="1"/>
-              <a:t>		</a:t>
-            </a:r>
-            <a:r>
-              <a:rPr lang="en-US" sz="1100" noProof="1"/>
-              <a:t>	</a:t>
+              <a:t>			</a:t>
             </a:r>
             <a:r>
               <a:rPr lang="en-US" sz="1100" noProof="1" smtClean="0"/>
@@ -15323,11 +15267,7 @@
           <a:p>
             <a:r>
               <a:rPr lang="en-US" sz="1100" noProof="1"/>
-              <a:t>		</a:t>
-            </a:r>
-            <a:r>
-              <a:rPr lang="en-US" sz="1100" noProof="1"/>
-              <a:t>	</a:t>
+              <a:t>			</a:t>
             </a:r>
             <a:r>
               <a:rPr lang="en-US" sz="1100" noProof="1" smtClean="0"/>
@@ -15806,11 +15746,7 @@
           <a:p>
             <a:r>
               <a:rPr lang="pt-BR" sz="1100" noProof="1"/>
-              <a:t>dnvm upgrade -arch x64 -</a:t>
-            </a:r>
-            <a:r>
-              <a:rPr lang="pt-BR" sz="1100" noProof="1"/>
-              <a:t>r </a:t>
+              <a:t>dnvm upgrade -arch x64 -r </a:t>
             </a:r>
             <a:r>
               <a:rPr lang="pt-BR" sz="1100" noProof="1" smtClean="0"/>
@@ -15823,11 +15759,7 @@
           <a:p>
             <a:r>
               <a:rPr lang="en-US" sz="1100" noProof="1"/>
-              <a:t>dnvm use 1.0.0-beta4-11566 -arch x64 -</a:t>
-            </a:r>
-            <a:r>
-              <a:rPr lang="en-US" sz="1100" noProof="1"/>
-              <a:t>r </a:t>
+              <a:t>dnvm use 1.0.0-beta4-11566 -arch x64 -r </a:t>
             </a:r>
             <a:r>
               <a:rPr lang="en-US" sz="1100" noProof="1" smtClean="0"/>
@@ -16821,11 +16753,7 @@
           <a:p>
             <a:r>
               <a:rPr lang="en-US" noProof="1" smtClean="0"/>
-              <a:t>    console.log("Got request for " + req.url</a:t>
-            </a:r>
-            <a:r>
-              <a:rPr lang="en-US" noProof="1" smtClean="0"/>
-              <a:t>);</a:t>
+              <a:t>    console.log("Got request for " + req.url);</a:t>
             </a:r>
           </a:p>
           <a:p>
@@ -17200,7 +17128,6 @@
               <a:rPr lang="en-US" noProof="1"/>
               <a:t>    1337,() =&gt; console.log("Listening on port 1337 ..."));</a:t>
             </a:r>
-            <a:endParaRPr lang="en-US" noProof="1"/>
           </a:p>
         </p:txBody>
       </p:sp>
@@ -17254,7 +17181,6 @@
               <a:rPr lang="en-US" dirty="0" smtClean="0"/>
               <a:t>Modular approach</a:t>
             </a:r>
-            <a:endParaRPr lang="en-US" dirty="0" smtClean="0"/>
           </a:p>
           <a:p>
             <a:pPr lvl="1"/>
@@ -17779,11 +17705,7 @@
           <a:p>
             <a:r>
               <a:rPr lang="en-US" noProof="1"/>
-              <a:t>	</a:t>
-            </a:r>
-            <a:r>
-              <a:rPr lang="en-US" noProof="1"/>
-              <a:t>	</a:t>
+              <a:t>		</a:t>
             </a:r>
             <a:r>
               <a:rPr lang="en-US" noProof="1" smtClean="0"/>
@@ -17832,8 +17754,23 @@
           <a:lstStyle/>
           <a:p>
             <a:r>
+              <a:rPr lang="en-US" i="1" dirty="0" err="1" smtClean="0"/>
+              <a:t>Microsoft.Owin.Hosting</a:t>
+            </a:r>
+            <a:endParaRPr lang="en-US" i="1" dirty="0" smtClean="0"/>
+          </a:p>
+          <a:p>
+            <a:r>
               <a:rPr lang="en-US" i="1" dirty="0" err="1"/>
-              <a:t>Microsoft.Owin.Hosting</a:t>
+              <a:t>Microsoft.Owin.Host</a:t>
+            </a:r>
+            <a:r>
+              <a:rPr lang="en-US" i="1" dirty="0" smtClean="0"/>
+              <a:t>. </a:t>
+            </a:r>
+            <a:r>
+              <a:rPr lang="en-US" i="1" dirty="0" err="1" smtClean="0"/>
+              <a:t>HttpListener</a:t>
             </a:r>
             <a:endParaRPr lang="en-US" i="1" dirty="0"/>
           </a:p>
@@ -17993,125 +17930,77 @@
           <a:p>
             <a:r>
               <a:rPr lang="en-US" noProof="1"/>
-              <a:t>		</a:t>
-            </a:r>
+              <a:t>			</a:t>
+            </a:r>
+            <a:r>
+              <a:rPr lang="en-US" noProof="1" smtClean="0"/>
+              <a:t>var </a:t>
+            </a:r>
+            <a:r>
+              <a:rPr lang="en-US" noProof="1"/>
+              <a:t>middleware = new Func&lt;AppFunc, AppFunc&gt;(next =&gt;</a:t>
+            </a:r>
+          </a:p>
+          <a:p>
+            <a:r>
+              <a:rPr lang="en-US" noProof="1"/>
+              <a:t>				async env =&gt;</a:t>
+            </a:r>
+          </a:p>
+          <a:p>
+            <a:r>
+              <a:rPr lang="en-US" noProof="1"/>
+              <a:t>				{</a:t>
+            </a:r>
+          </a:p>
+          <a:p>
+            <a:r>
+              <a:rPr lang="en-US" noProof="1"/>
+              <a:t>					</a:t>
+            </a:r>
+            <a:r>
+              <a:rPr lang="en-US" noProof="1" smtClean="0"/>
+              <a:t>var </a:t>
+            </a:r>
+            <a:r>
+              <a:rPr lang="en-US" noProof="1"/>
+              <a:t>bytes = Encoding.UTF8.GetBytes</a:t>
+            </a:r>
+            <a:r>
+              <a:rPr lang="en-US" noProof="1" smtClean="0"/>
+              <a:t>(</a:t>
+            </a:r>
+          </a:p>
+          <a:p>
             <a:r>
               <a:rPr lang="en-US" noProof="1"/>
               <a:t>	</a:t>
             </a:r>
             <a:r>
               <a:rPr lang="en-US" noProof="1" smtClean="0"/>
-              <a:t>var </a:t>
+              <a:t>					"</a:t>
             </a:r>
             <a:r>
               <a:rPr lang="en-US" noProof="1"/>
-              <a:t>middleware = new Func&lt;AppFunc, AppFunc&gt;(next =&gt;</a:t>
+              <a:t>Hello OWIN!");</a:t>
             </a:r>
           </a:p>
           <a:p>
             <a:r>
               <a:rPr lang="en-US" noProof="1"/>
-              <a:t>		</a:t>
-            </a:r>
+              <a:t>					var headers = (IDictionary&lt;string, string</a:t>
+            </a:r>
+            <a:r>
+              <a:rPr lang="en-US" noProof="1" smtClean="0"/>
+              <a:t>[]&gt;)</a:t>
+            </a:r>
+          </a:p>
+          <a:p>
             <a:r>
               <a:rPr lang="en-US" noProof="1"/>
               <a:t>	</a:t>
             </a:r>
             <a:r>
-              <a:rPr lang="en-US" noProof="1"/>
-              <a:t>	async env =&gt;</a:t>
-            </a:r>
-          </a:p>
-          <a:p>
-            <a:r>
-              <a:rPr lang="en-US" noProof="1"/>
-              <a:t>		</a:t>
-            </a:r>
-            <a:r>
-              <a:rPr lang="en-US" noProof="1"/>
-              <a:t>	</a:t>
-            </a:r>
-            <a:r>
-              <a:rPr lang="en-US" noProof="1"/>
-              <a:t>	{</a:t>
-            </a:r>
-          </a:p>
-          <a:p>
-            <a:r>
-              <a:rPr lang="en-US" noProof="1"/>
-              <a:t>		</a:t>
-            </a:r>
-            <a:r>
-              <a:rPr lang="en-US" noProof="1"/>
-              <a:t>	</a:t>
-            </a:r>
-            <a:r>
-              <a:rPr lang="en-US" noProof="1"/>
-              <a:t>	</a:t>
-            </a:r>
-            <a:r>
-              <a:rPr lang="en-US" noProof="1"/>
-              <a:t>	</a:t>
-            </a:r>
-            <a:r>
-              <a:rPr lang="en-US" noProof="1" smtClean="0"/>
-              <a:t>var </a:t>
-            </a:r>
-            <a:r>
-              <a:rPr lang="en-US" noProof="1"/>
-              <a:t>bytes = </a:t>
-            </a:r>
-            <a:r>
-              <a:rPr lang="en-US" noProof="1"/>
-              <a:t>Encoding.UTF8.GetBytes</a:t>
-            </a:r>
-            <a:r>
-              <a:rPr lang="en-US" noProof="1" smtClean="0"/>
-              <a:t>(</a:t>
-            </a:r>
-          </a:p>
-          <a:p>
-            <a:r>
-              <a:rPr lang="en-US" noProof="1"/>
-              <a:t>	</a:t>
-            </a:r>
-            <a:r>
-              <a:rPr lang="en-US" noProof="1" smtClean="0"/>
-              <a:t>					"</a:t>
-            </a:r>
-            <a:r>
-              <a:rPr lang="en-US" noProof="1"/>
-              <a:t>Hello OWIN!");</a:t>
-            </a:r>
-          </a:p>
-          <a:p>
-            <a:r>
-              <a:rPr lang="en-US" noProof="1"/>
-              <a:t>		</a:t>
-            </a:r>
-            <a:r>
-              <a:rPr lang="en-US" noProof="1"/>
-              <a:t>	</a:t>
-            </a:r>
-            <a:r>
-              <a:rPr lang="en-US" noProof="1"/>
-              <a:t>		var headers = (IDictionary&lt;string, </a:t>
-            </a:r>
-            <a:r>
-              <a:rPr lang="en-US" noProof="1"/>
-              <a:t>string</a:t>
-            </a:r>
-            <a:r>
-              <a:rPr lang="en-US" noProof="1" smtClean="0"/>
-              <a:t>[]&gt;)</a:t>
-            </a:r>
-          </a:p>
-          <a:p>
-            <a:r>
-              <a:rPr lang="en-US" noProof="1"/>
-              <a:t>	</a:t>
-            </a:r>
-            <a:r>
               <a:rPr lang="en-US" noProof="1" smtClean="0"/>
               <a:t>					env</a:t>
             </a:r>
@@ -18123,60 +18012,28 @@
           <a:p>
             <a:r>
               <a:rPr lang="en-US" noProof="1"/>
-              <a:t>		</a:t>
-            </a:r>
+              <a:t>					headers["Content-Type"] = new[] { "text/html" };</a:t>
+            </a:r>
+          </a:p>
+          <a:p>
             <a:r>
               <a:rPr lang="en-US" noProof="1"/>
-              <a:t>	</a:t>
-            </a:r>
+              <a:t>					var response = (Stream)env["owin.ResponseBody"];</a:t>
+            </a:r>
+          </a:p>
+          <a:p>
             <a:r>
               <a:rPr lang="en-US" noProof="1"/>
-              <a:t>		headers["Content-Type"] = new[] { "text/html" };</a:t>
-            </a:r>
+              <a:t>					await response.WriteAsync(bytes, 0, bytes.Length);</a:t>
+            </a:r>
+          </a:p>
+          <a:p>
+            <a:endParaRPr lang="en-US" noProof="1"/>
           </a:p>
           <a:p>
             <a:r>
               <a:rPr lang="en-US" noProof="1"/>
-              <a:t>		</a:t>
-            </a:r>
-            <a:r>
-              <a:rPr lang="en-US" noProof="1"/>
-              <a:t>	</a:t>
-            </a:r>
-            <a:r>
-              <a:rPr lang="en-US" noProof="1"/>
-              <a:t>		var response = (Stream)env["owin.ResponseBody"];</a:t>
-            </a:r>
-          </a:p>
-          <a:p>
-            <a:r>
-              <a:rPr lang="en-US" noProof="1"/>
-              <a:t>		</a:t>
-            </a:r>
-            <a:r>
-              <a:rPr lang="en-US" noProof="1"/>
-              <a:t>	</a:t>
-            </a:r>
-            <a:r>
-              <a:rPr lang="en-US" noProof="1"/>
-              <a:t>		await response.WriteAsync(bytes, 0, bytes.Length);</a:t>
-            </a:r>
-          </a:p>
-          <a:p>
-            <a:endParaRPr lang="en-US" noProof="1"/>
-          </a:p>
-          <a:p>
-            <a:r>
-              <a:rPr lang="en-US" noProof="1"/>
-              <a:t>		</a:t>
-            </a:r>
-            <a:r>
-              <a:rPr lang="en-US" noProof="1"/>
-              <a:t>	</a:t>
-            </a:r>
-            <a:r>
-              <a:rPr lang="en-US" noProof="1"/>
-              <a:t>		await </a:t>
+              <a:t>					await </a:t>
             </a:r>
             <a:r>
               <a:rPr lang="en-US" noProof="1">
@@ -18194,11 +18051,7 @@
           <a:p>
             <a:r>
               <a:rPr lang="en-US" noProof="1"/>
-              <a:t>		</a:t>
-            </a:r>
-            <a:r>
-              <a:rPr lang="en-US" noProof="1"/>
-              <a:t>		</a:t>
+              <a:t>				</a:t>
             </a:r>
             <a:r>
               <a:rPr lang="en-US" noProof="1" smtClean="0"/>
@@ -18209,10 +18062,14 @@
           <a:p>
             <a:r>
               <a:rPr lang="en-US" noProof="1"/>
-              <a:t>				owinApp</a:t>
-            </a:r>
-            <a:r>
-              <a:rPr lang="en-US" noProof="1">
+              <a:t>				</a:t>
+            </a:r>
+            <a:r>
+              <a:rPr lang="en-US" noProof="1" smtClean="0"/>
+              <a:t>app</a:t>
+            </a:r>
+            <a:r>
+              <a:rPr lang="en-US" noProof="1" smtClean="0">
                 <a:solidFill>
                   <a:srgbClr val="00B050"/>
                 </a:solidFill>
@@ -18220,8 +18077,12 @@
               <a:t>.Use</a:t>
             </a:r>
             <a:r>
+              <a:rPr lang="en-US" noProof="1" smtClean="0"/>
+              <a:t>(middleware</a:t>
+            </a:r>
+            <a:r>
               <a:rPr lang="en-US" noProof="1"/>
-              <a:t>(middleware);</a:t>
+              <a:t>);</a:t>
             </a:r>
           </a:p>
           <a:p>
@@ -19429,12 +19290,12 @@
 <file path=customXml/itemProps1.xml><?xml version="1.0" encoding="utf-8"?>
 <ds:datastoreItem xmlns:ds="http://schemas.openxmlformats.org/officeDocument/2006/customXml" ds:itemID="{03D43D4A-F5F8-47F6-A4EC-521F433C91BF}">
   <ds:schemaRefs>
-    <ds:schemaRef ds:uri="http://purl.org/dc/dcmitype/"/>
+    <ds:schemaRef ds:uri="http://schemas.microsoft.com/office/2006/metadata/properties"/>
+    <ds:schemaRef ds:uri="http://www.w3.org/XML/1998/namespace"/>
+    <ds:schemaRef ds:uri="http://purl.org/dc/elements/1.1/"/>
     <ds:schemaRef ds:uri="http://schemas.microsoft.com/office/2006/documentManagement/types"/>
     <ds:schemaRef ds:uri="http://schemas.openxmlformats.org/package/2006/metadata/core-properties"/>
-    <ds:schemaRef ds:uri="http://www.w3.org/XML/1998/namespace"/>
-    <ds:schemaRef ds:uri="http://purl.org/dc/elements/1.1/"/>
-    <ds:schemaRef ds:uri="http://schemas.microsoft.com/office/2006/metadata/properties"/>
+    <ds:schemaRef ds:uri="http://purl.org/dc/dcmitype/"/>
     <ds:schemaRef ds:uri="http://purl.org/dc/terms/"/>
   </ds:schemaRefs>
 </ds:datastoreItem>

</xml_diff>